<commit_message>
Swapping order of two slides.
</commit_message>
<xml_diff>
--- a/0 - Introduction/20180621 - Modern Microservices - Intro.pptx
+++ b/0 - Introduction/20180621 - Modern Microservices - Intro.pptx
@@ -1877,76 +1877,7 @@
               <a:buNone/>
             </a:pPr>
             <a:r>
-              <a:rPr lang="en-US"/>
-              <a:t>Talk a bit about:</a:t>
-            </a:r>
-            <a:endParaRPr/>
-          </a:p>
-          <a:p>
-            <a:pPr indent="-317500" lvl="0" marL="457200" rtl="0">
-              <a:spcBef>
-                <a:spcPts val="0"/>
-              </a:spcBef>
-              <a:spcAft>
-                <a:spcPts val="0"/>
-              </a:spcAft>
-              <a:buSzPts val="1400"/>
-              <a:buChar char="●"/>
-            </a:pPr>
-            <a:r>
-              <a:rPr lang="en-US"/>
-              <a:t>We’re starting basic, but not “Cloud 101”</a:t>
-            </a:r>
-            <a:endParaRPr/>
-          </a:p>
-          <a:p>
-            <a:pPr indent="-317500" lvl="0" marL="457200" rtl="0">
-              <a:spcBef>
-                <a:spcPts val="0"/>
-              </a:spcBef>
-              <a:spcAft>
-                <a:spcPts val="0"/>
-              </a:spcAft>
-              <a:buSzPts val="1400"/>
-              <a:buChar char="●"/>
-            </a:pPr>
-            <a:r>
-              <a:rPr lang="en-US"/>
-              <a:t>We’ll get more advanced in future sessions</a:t>
-            </a:r>
-            <a:endParaRPr/>
-          </a:p>
-          <a:p>
-            <a:pPr indent="-317500" lvl="0" marL="457200" rtl="0">
-              <a:spcBef>
-                <a:spcPts val="0"/>
-              </a:spcBef>
-              <a:spcAft>
-                <a:spcPts val="0"/>
-              </a:spcAft>
-              <a:buSzPts val="1400"/>
-              <a:buChar char="●"/>
-            </a:pPr>
-            <a:r>
-              <a:rPr lang="en-US"/>
-              <a:t>Today, we’re keeping it high level</a:t>
-            </a:r>
-            <a:endParaRPr/>
-          </a:p>
-          <a:p>
-            <a:pPr indent="-317500" lvl="0" marL="457200" rtl="0">
-              <a:spcBef>
-                <a:spcPts val="0"/>
-              </a:spcBef>
-              <a:spcAft>
-                <a:spcPts val="0"/>
-              </a:spcAft>
-              <a:buSzPts val="1400"/>
-              <a:buChar char="●"/>
-            </a:pPr>
-            <a:r>
-              <a:rPr lang="en-US"/>
-              <a:t>Ask questions throughout the session, don’t wait until the end</a:t>
+              <a:t/>
             </a:r>
             <a:endParaRPr/>
           </a:p>
@@ -1963,7 +1894,7 @@
         <p:spPr>
           <a:xfrm>
             <a:off x="1143225" y="685800"/>
-            <a:ext cx="4572300" cy="3429000"/>
+            <a:ext cx="4572225" cy="3429000"/>
           </a:xfrm>
           <a:custGeom>
             <a:pathLst>
@@ -2509,7 +2440,7 @@
   <p:cSld>
     <p:spTree>
       <p:nvGrpSpPr>
-        <p:cNvPr id="135" name="Shape 135"/>
+        <p:cNvPr id="136" name="Shape 136"/>
         <p:cNvGrpSpPr/>
         <p:nvPr/>
       </p:nvGrpSpPr>
@@ -2523,7 +2454,7 @@
       </p:grpSpPr>
       <p:sp>
         <p:nvSpPr>
-          <p:cNvPr id="136" name="Shape 136"/>
+          <p:cNvPr id="137" name="Shape 137"/>
           <p:cNvSpPr txBox="1"/>
           <p:nvPr>
             <p:ph idx="1" type="body"/>
@@ -2558,7 +2489,76 @@
               <a:buNone/>
             </a:pPr>
             <a:r>
-              <a:t/>
+              <a:rPr lang="en-US"/>
+              <a:t>Talk a bit about:</a:t>
+            </a:r>
+            <a:endParaRPr/>
+          </a:p>
+          <a:p>
+            <a:pPr indent="-317500" lvl="0" marL="457200" rtl="0">
+              <a:spcBef>
+                <a:spcPts val="0"/>
+              </a:spcBef>
+              <a:spcAft>
+                <a:spcPts val="0"/>
+              </a:spcAft>
+              <a:buSzPts val="1400"/>
+              <a:buChar char="●"/>
+            </a:pPr>
+            <a:r>
+              <a:rPr lang="en-US"/>
+              <a:t>We’re starting basic, but not “Cloud 101”</a:t>
+            </a:r>
+            <a:endParaRPr/>
+          </a:p>
+          <a:p>
+            <a:pPr indent="-317500" lvl="0" marL="457200" rtl="0">
+              <a:spcBef>
+                <a:spcPts val="0"/>
+              </a:spcBef>
+              <a:spcAft>
+                <a:spcPts val="0"/>
+              </a:spcAft>
+              <a:buSzPts val="1400"/>
+              <a:buChar char="●"/>
+            </a:pPr>
+            <a:r>
+              <a:rPr lang="en-US"/>
+              <a:t>We’ll get more advanced in future sessions</a:t>
+            </a:r>
+            <a:endParaRPr/>
+          </a:p>
+          <a:p>
+            <a:pPr indent="-317500" lvl="0" marL="457200" rtl="0">
+              <a:spcBef>
+                <a:spcPts val="0"/>
+              </a:spcBef>
+              <a:spcAft>
+                <a:spcPts val="0"/>
+              </a:spcAft>
+              <a:buSzPts val="1400"/>
+              <a:buChar char="●"/>
+            </a:pPr>
+            <a:r>
+              <a:rPr lang="en-US"/>
+              <a:t>Today, we’re keeping it high level</a:t>
+            </a:r>
+            <a:endParaRPr/>
+          </a:p>
+          <a:p>
+            <a:pPr indent="-317500" lvl="0" marL="457200" rtl="0">
+              <a:spcBef>
+                <a:spcPts val="0"/>
+              </a:spcBef>
+              <a:spcAft>
+                <a:spcPts val="0"/>
+              </a:spcAft>
+              <a:buSzPts val="1400"/>
+              <a:buChar char="●"/>
+            </a:pPr>
+            <a:r>
+              <a:rPr lang="en-US"/>
+              <a:t>Ask questions throughout the session, don’t wait until the end</a:t>
             </a:r>
             <a:endParaRPr/>
           </a:p>
@@ -2566,7 +2566,7 @@
       </p:sp>
       <p:sp>
         <p:nvSpPr>
-          <p:cNvPr id="137" name="Shape 137"/>
+          <p:cNvPr id="138" name="Shape 138"/>
           <p:cNvSpPr/>
           <p:nvPr>
             <p:ph idx="2" type="sldImg"/>
@@ -2575,7 +2575,7 @@
         <p:spPr>
           <a:xfrm>
             <a:off x="1143225" y="685800"/>
-            <a:ext cx="4572225" cy="3429000"/>
+            <a:ext cx="4572300" cy="3429000"/>
           </a:xfrm>
           <a:custGeom>
             <a:pathLst>
@@ -32169,30 +32169,81 @@
           <a:chExt cx="0" cy="0"/>
         </a:xfrm>
       </p:grpSpPr>
+      <p:sp>
+        <p:nvSpPr>
+          <p:cNvPr id="124" name="Shape 124"/>
+          <p:cNvSpPr/>
+          <p:nvPr/>
+        </p:nvSpPr>
+        <p:spPr>
+          <a:xfrm>
+            <a:off x="4315600" y="0"/>
+            <a:ext cx="4828400" cy="6858000"/>
+          </a:xfrm>
+          <a:prstGeom prst="rect">
+            <a:avLst/>
+          </a:prstGeom>
+          <a:solidFill>
+            <a:srgbClr val="333E48"/>
+          </a:solidFill>
+          <a:ln>
+            <a:noFill/>
+          </a:ln>
+        </p:spPr>
+        <p:txBody>
+          <a:bodyPr anchorCtr="0" anchor="t" bIns="45700" lIns="91425" spcFirstLastPara="1" rIns="91425" wrap="square" tIns="45700">
+            <a:noAutofit/>
+          </a:bodyPr>
+          <a:lstStyle/>
+          <a:p>
+            <a:pPr indent="0" lvl="0" marL="0" marR="0" rtl="0" algn="ctr">
+              <a:spcBef>
+                <a:spcPts val="0"/>
+              </a:spcBef>
+              <a:spcAft>
+                <a:spcPts val="0"/>
+              </a:spcAft>
+              <a:buNone/>
+            </a:pPr>
+            <a:r>
+              <a:t/>
+            </a:r>
+            <a:endParaRPr sz="1200">
+              <a:solidFill>
+                <a:srgbClr val="333E48"/>
+              </a:solidFill>
+              <a:latin typeface="Roboto"/>
+              <a:ea typeface="Roboto"/>
+              <a:cs typeface="Roboto"/>
+              <a:sym typeface="Roboto"/>
+            </a:endParaRPr>
+          </a:p>
+        </p:txBody>
+      </p:sp>
       <p:grpSp>
         <p:nvGrpSpPr>
-          <p:cNvPr id="124" name="Shape 124"/>
+          <p:cNvPr id="125" name="Shape 125"/>
           <p:cNvGrpSpPr/>
           <p:nvPr/>
         </p:nvGrpSpPr>
         <p:grpSpPr>
           <a:xfrm>
-            <a:off x="-114" y="-45763"/>
-            <a:ext cx="9144230" cy="45717"/>
-            <a:chOff x="-115" y="4239484"/>
-            <a:chExt cx="9144230" cy="184640"/>
+            <a:off x="0" y="-45720"/>
+            <a:ext cx="9144000" cy="45719"/>
+            <a:chOff x="-1" y="4239484"/>
+            <a:chExt cx="9144001" cy="184641"/>
           </a:xfrm>
         </p:grpSpPr>
         <p:sp>
           <p:nvSpPr>
-            <p:cNvPr id="125" name="Shape 125"/>
+            <p:cNvPr id="126" name="Shape 126"/>
             <p:cNvSpPr/>
             <p:nvPr/>
           </p:nvSpPr>
           <p:spPr>
             <a:xfrm rot="10800000">
-              <a:off x="-115" y="4239624"/>
-              <a:ext cx="1581900" cy="184500"/>
+              <a:off x="-1" y="4239487"/>
+              <a:ext cx="1581786" cy="184637"/>
             </a:xfrm>
             <a:prstGeom prst="rect">
               <a:avLst/>
@@ -32236,14 +32287,14 @@
         </p:sp>
         <p:sp>
           <p:nvSpPr>
-            <p:cNvPr id="126" name="Shape 126"/>
+            <p:cNvPr id="127" name="Shape 127"/>
             <p:cNvSpPr/>
             <p:nvPr/>
           </p:nvSpPr>
           <p:spPr>
             <a:xfrm>
               <a:off x="1512443" y="4239484"/>
-              <a:ext cx="1581900" cy="184500"/>
+              <a:ext cx="1581785" cy="184641"/>
             </a:xfrm>
             <a:prstGeom prst="rect">
               <a:avLst/>
@@ -32287,14 +32338,14 @@
         </p:sp>
         <p:sp>
           <p:nvSpPr>
-            <p:cNvPr id="127" name="Shape 127"/>
+            <p:cNvPr id="128" name="Shape 128"/>
             <p:cNvSpPr/>
             <p:nvPr/>
           </p:nvSpPr>
           <p:spPr>
             <a:xfrm>
               <a:off x="3024886" y="4239484"/>
-              <a:ext cx="1581900" cy="184500"/>
+              <a:ext cx="1581785" cy="184641"/>
             </a:xfrm>
             <a:prstGeom prst="rect">
               <a:avLst/>
@@ -32338,14 +32389,14 @@
         </p:sp>
         <p:sp>
           <p:nvSpPr>
-            <p:cNvPr id="128" name="Shape 128"/>
+            <p:cNvPr id="129" name="Shape 129"/>
             <p:cNvSpPr/>
             <p:nvPr/>
           </p:nvSpPr>
           <p:spPr>
             <a:xfrm>
               <a:off x="4537329" y="4239484"/>
-              <a:ext cx="1581900" cy="184500"/>
+              <a:ext cx="1581785" cy="184641"/>
             </a:xfrm>
             <a:prstGeom prst="rect">
               <a:avLst/>
@@ -32389,14 +32440,14 @@
         </p:sp>
         <p:sp>
           <p:nvSpPr>
-            <p:cNvPr id="129" name="Shape 129"/>
+            <p:cNvPr id="130" name="Shape 130"/>
             <p:cNvSpPr/>
             <p:nvPr/>
           </p:nvSpPr>
           <p:spPr>
             <a:xfrm>
               <a:off x="6049772" y="4239484"/>
-              <a:ext cx="1581900" cy="184500"/>
+              <a:ext cx="1581785" cy="184641"/>
             </a:xfrm>
             <a:prstGeom prst="rect">
               <a:avLst/>
@@ -32440,14 +32491,14 @@
         </p:sp>
         <p:sp>
           <p:nvSpPr>
-            <p:cNvPr id="130" name="Shape 130"/>
+            <p:cNvPr id="131" name="Shape 131"/>
             <p:cNvSpPr/>
             <p:nvPr/>
           </p:nvSpPr>
           <p:spPr>
             <a:xfrm>
               <a:off x="7562215" y="4239484"/>
-              <a:ext cx="1581900" cy="184500"/>
+              <a:ext cx="1581785" cy="184641"/>
             </a:xfrm>
             <a:prstGeom prst="rect">
               <a:avLst/>
@@ -32492,14 +32543,14 @@
       </p:grpSp>
       <p:sp>
         <p:nvSpPr>
-          <p:cNvPr id="131" name="Shape 131"/>
+          <p:cNvPr id="132" name="Shape 132"/>
           <p:cNvSpPr txBox="1"/>
           <p:nvPr/>
         </p:nvSpPr>
         <p:spPr>
           <a:xfrm>
-            <a:off x="297475" y="135094"/>
-            <a:ext cx="4615500" cy="702300"/>
+            <a:off x="220784" y="179350"/>
+            <a:ext cx="3518096" cy="1323439"/>
           </a:xfrm>
           <a:prstGeom prst="rect">
             <a:avLst/>
@@ -32534,7 +32585,39 @@
                 <a:cs typeface="Roboto"/>
                 <a:sym typeface="Roboto"/>
               </a:rPr>
-              <a:t>Agenda</a:t>
+              <a:t>About </a:t>
+            </a:r>
+            <a:endParaRPr b="1" sz="4000">
+              <a:solidFill>
+                <a:srgbClr val="333E48"/>
+              </a:solidFill>
+              <a:latin typeface="Roboto"/>
+              <a:ea typeface="Roboto"/>
+              <a:cs typeface="Roboto"/>
+              <a:sym typeface="Roboto"/>
+            </a:endParaRPr>
+          </a:p>
+          <a:p>
+            <a:pPr indent="0" lvl="0" marL="0" marR="0" rtl="0" algn="l">
+              <a:spcBef>
+                <a:spcPts val="0"/>
+              </a:spcBef>
+              <a:spcAft>
+                <a:spcPts val="0"/>
+              </a:spcAft>
+              <a:buNone/>
+            </a:pPr>
+            <a:r>
+              <a:rPr b="1" lang="en-US" sz="4000">
+                <a:solidFill>
+                  <a:srgbClr val="333E48"/>
+                </a:solidFill>
+                <a:latin typeface="Roboto"/>
+                <a:ea typeface="Roboto"/>
+                <a:cs typeface="Roboto"/>
+                <a:sym typeface="Roboto"/>
+              </a:rPr>
+              <a:t>Kenzan</a:t>
             </a:r>
             <a:endParaRPr b="1" sz="4000">
               <a:solidFill>
@@ -32548,72 +32631,16 @@
           </a:p>
         </p:txBody>
       </p:sp>
-      <p:pic>
-        <p:nvPicPr>
-          <p:cNvPr id="132" name="Shape 132"/>
-          <p:cNvPicPr preferRelativeResize="0"/>
-          <p:nvPr/>
-        </p:nvPicPr>
-        <p:blipFill>
-          <a:blip r:embed="rId3">
-            <a:alphaModFix/>
-          </a:blip>
-          <a:stretch>
-            <a:fillRect/>
-          </a:stretch>
-        </p:blipFill>
-        <p:spPr>
-          <a:xfrm>
-            <a:off x="407175" y="913475"/>
-            <a:ext cx="8736951" cy="6400626"/>
-          </a:xfrm>
-          <a:prstGeom prst="rect">
-            <a:avLst/>
-          </a:prstGeom>
-          <a:noFill/>
-          <a:ln>
-            <a:noFill/>
-          </a:ln>
-        </p:spPr>
-      </p:pic>
-      <p:pic>
-        <p:nvPicPr>
-          <p:cNvPr id="133" name="Shape 133"/>
-          <p:cNvPicPr preferRelativeResize="0"/>
-          <p:nvPr/>
-        </p:nvPicPr>
-        <p:blipFill>
-          <a:blip r:embed="rId4">
-            <a:alphaModFix/>
-          </a:blip>
-          <a:stretch>
-            <a:fillRect/>
-          </a:stretch>
-        </p:blipFill>
-        <p:spPr>
-          <a:xfrm>
-            <a:off x="0" y="1674625"/>
-            <a:ext cx="5761850" cy="3834250"/>
-          </a:xfrm>
-          <a:prstGeom prst="rect">
-            <a:avLst/>
-          </a:prstGeom>
-          <a:noFill/>
-          <a:ln>
-            <a:noFill/>
-          </a:ln>
-        </p:spPr>
-      </p:pic>
       <p:sp>
         <p:nvSpPr>
-          <p:cNvPr id="134" name="Shape 134"/>
+          <p:cNvPr id="133" name="Shape 133"/>
           <p:cNvSpPr/>
           <p:nvPr/>
         </p:nvSpPr>
         <p:spPr>
           <a:xfrm>
-            <a:off x="716350" y="2019000"/>
-            <a:ext cx="4806600" cy="2972400"/>
+            <a:off x="220784" y="1682140"/>
+            <a:ext cx="3518096" cy="3331681"/>
           </a:xfrm>
           <a:prstGeom prst="rect">
             <a:avLst/>
@@ -32630,9 +32657,6 @@
           <a:lstStyle/>
           <a:p>
             <a:pPr indent="0" lvl="0" marL="0" marR="0" rtl="0" algn="l">
-              <a:lnSpc>
-                <a:spcPct val="100000"/>
-              </a:lnSpc>
               <a:spcBef>
                 <a:spcPts val="0"/>
               </a:spcBef>
@@ -32642,181 +32666,21 @@
               <a:buNone/>
             </a:pPr>
             <a:r>
-              <a:rPr b="1" lang="en-US" sz="1800">
-                <a:solidFill>
-                  <a:schemeClr val="lt1"/>
+              <a:rPr b="1" lang="en-US" sz="1400">
+                <a:solidFill>
+                  <a:srgbClr val="333E48"/>
                 </a:solidFill>
                 <a:latin typeface="Roboto"/>
                 <a:ea typeface="Roboto"/>
                 <a:cs typeface="Roboto"/>
                 <a:sym typeface="Roboto"/>
               </a:rPr>
-              <a:t>Multiple Part Series Focusing on:</a:t>
-            </a:r>
-            <a:endParaRPr b="1" sz="1800">
-              <a:solidFill>
-                <a:schemeClr val="lt1"/>
-              </a:solidFill>
-              <a:latin typeface="Roboto"/>
-              <a:ea typeface="Roboto"/>
-              <a:cs typeface="Roboto"/>
-              <a:sym typeface="Roboto"/>
-            </a:endParaRPr>
-          </a:p>
-          <a:p>
-            <a:pPr indent="-342900" lvl="0" marL="457200" marR="0" rtl="0" algn="l">
-              <a:lnSpc>
-                <a:spcPct val="100000"/>
-              </a:lnSpc>
-              <a:spcBef>
-                <a:spcPts val="600"/>
-              </a:spcBef>
-              <a:spcAft>
-                <a:spcPts val="0"/>
-              </a:spcAft>
-              <a:buClr>
-                <a:schemeClr val="lt1"/>
-              </a:buClr>
-              <a:buSzPts val="1800"/>
-              <a:buFont typeface="Roboto"/>
-              <a:buChar char="●"/>
-            </a:pPr>
-            <a:r>
-              <a:rPr b="1" lang="en-US" sz="1800">
-                <a:solidFill>
-                  <a:schemeClr val="lt1"/>
-                </a:solidFill>
-                <a:latin typeface="Roboto"/>
-                <a:ea typeface="Roboto"/>
-                <a:cs typeface="Roboto"/>
-                <a:sym typeface="Roboto"/>
-              </a:rPr>
-              <a:t>Platform &amp; Infrastructure</a:t>
-            </a:r>
-            <a:endParaRPr b="1" sz="1800">
-              <a:solidFill>
-                <a:schemeClr val="lt1"/>
-              </a:solidFill>
-              <a:latin typeface="Roboto"/>
-              <a:ea typeface="Roboto"/>
-              <a:cs typeface="Roboto"/>
-              <a:sym typeface="Roboto"/>
-            </a:endParaRPr>
-          </a:p>
-          <a:p>
-            <a:pPr indent="-342900" lvl="0" marL="457200" marR="0" rtl="0" algn="l">
-              <a:lnSpc>
-                <a:spcPct val="100000"/>
-              </a:lnSpc>
-              <a:spcBef>
-                <a:spcPts val="0"/>
-              </a:spcBef>
-              <a:spcAft>
-                <a:spcPts val="0"/>
-              </a:spcAft>
-              <a:buClr>
-                <a:schemeClr val="lt1"/>
-              </a:buClr>
-              <a:buSzPts val="1800"/>
-              <a:buFont typeface="Roboto"/>
-              <a:buChar char="●"/>
-            </a:pPr>
-            <a:r>
-              <a:rPr b="1" lang="en-US" sz="1800">
-                <a:solidFill>
-                  <a:schemeClr val="lt1"/>
-                </a:solidFill>
-                <a:latin typeface="Roboto"/>
-                <a:ea typeface="Roboto"/>
-                <a:cs typeface="Roboto"/>
-                <a:sym typeface="Roboto"/>
-              </a:rPr>
-              <a:t>Continuous Delivery</a:t>
-            </a:r>
-            <a:endParaRPr b="1" sz="1800">
-              <a:solidFill>
-                <a:schemeClr val="lt1"/>
-              </a:solidFill>
-              <a:latin typeface="Roboto"/>
-              <a:ea typeface="Roboto"/>
-              <a:cs typeface="Roboto"/>
-              <a:sym typeface="Roboto"/>
-            </a:endParaRPr>
-          </a:p>
-          <a:p>
-            <a:pPr indent="-342900" lvl="0" marL="457200" marR="0" rtl="0" algn="l">
-              <a:lnSpc>
-                <a:spcPct val="100000"/>
-              </a:lnSpc>
-              <a:spcBef>
-                <a:spcPts val="0"/>
-              </a:spcBef>
-              <a:spcAft>
-                <a:spcPts val="0"/>
-              </a:spcAft>
-              <a:buClr>
-                <a:schemeClr val="lt1"/>
-              </a:buClr>
-              <a:buSzPts val="1800"/>
-              <a:buFont typeface="Roboto"/>
-              <a:buChar char="●"/>
-            </a:pPr>
-            <a:r>
-              <a:rPr b="1" lang="en-US" sz="1800">
-                <a:solidFill>
-                  <a:schemeClr val="lt1"/>
-                </a:solidFill>
-                <a:latin typeface="Roboto"/>
-                <a:ea typeface="Roboto"/>
-                <a:cs typeface="Roboto"/>
-                <a:sym typeface="Roboto"/>
-              </a:rPr>
-              <a:t>Continuous Integration</a:t>
-            </a:r>
-            <a:endParaRPr b="1" sz="1800">
-              <a:solidFill>
-                <a:schemeClr val="lt1"/>
-              </a:solidFill>
-              <a:latin typeface="Roboto"/>
-              <a:ea typeface="Roboto"/>
-              <a:cs typeface="Roboto"/>
-              <a:sym typeface="Roboto"/>
-            </a:endParaRPr>
-          </a:p>
-          <a:p>
-            <a:pPr indent="-342900" lvl="0" marL="457200" marR="0" rtl="0" algn="l">
-              <a:lnSpc>
-                <a:spcPct val="100000"/>
-              </a:lnSpc>
-              <a:spcBef>
-                <a:spcPts val="0"/>
-              </a:spcBef>
-              <a:spcAft>
-                <a:spcPts val="0"/>
-              </a:spcAft>
-              <a:buClr>
-                <a:schemeClr val="lt1"/>
-              </a:buClr>
-              <a:buSzPts val="1800"/>
-              <a:buFont typeface="Roboto"/>
-              <a:buChar char="●"/>
-            </a:pPr>
-            <a:r>
-              <a:rPr b="1" lang="en-US" sz="1800">
-                <a:solidFill>
-                  <a:schemeClr val="lt1"/>
-                </a:solidFill>
-                <a:latin typeface="Roboto"/>
-                <a:ea typeface="Roboto"/>
-                <a:cs typeface="Roboto"/>
-                <a:sym typeface="Roboto"/>
-              </a:rPr>
-              <a:t>Application</a:t>
+              <a:t>Core offerings</a:t>
             </a:r>
             <a:br>
-              <a:rPr b="1" lang="en-US" sz="1800">
-                <a:solidFill>
-                  <a:schemeClr val="lt1"/>
+              <a:rPr lang="en-US" sz="1200">
+                <a:solidFill>
+                  <a:srgbClr val="333E48"/>
                 </a:solidFill>
                 <a:latin typeface="Roboto"/>
                 <a:ea typeface="Roboto"/>
@@ -32824,7 +32688,545 @@
                 <a:sym typeface="Roboto"/>
               </a:rPr>
             </a:br>
-            <a:endParaRPr b="1" sz="1800">
+            <a:r>
+              <a:rPr lang="en-US" sz="1200">
+                <a:solidFill>
+                  <a:srgbClr val="333E48"/>
+                </a:solidFill>
+                <a:latin typeface="Roboto"/>
+                <a:ea typeface="Roboto"/>
+                <a:cs typeface="Roboto"/>
+                <a:sym typeface="Roboto"/>
+              </a:rPr>
+              <a:t>Application Development, Platform as a service, cloud virtualization, platform engineering, consulting services and business transformation.</a:t>
+            </a:r>
+            <a:endParaRPr sz="1200">
+              <a:solidFill>
+                <a:srgbClr val="333E48"/>
+              </a:solidFill>
+              <a:latin typeface="Calibri"/>
+              <a:ea typeface="Calibri"/>
+              <a:cs typeface="Calibri"/>
+              <a:sym typeface="Calibri"/>
+            </a:endParaRPr>
+          </a:p>
+          <a:p>
+            <a:pPr indent="0" lvl="0" marL="0" marR="0" rtl="0" algn="l">
+              <a:spcBef>
+                <a:spcPts val="900"/>
+              </a:spcBef>
+              <a:spcAft>
+                <a:spcPts val="0"/>
+              </a:spcAft>
+              <a:buNone/>
+            </a:pPr>
+            <a:r>
+              <a:rPr b="1" lang="en-US" sz="1400">
+                <a:solidFill>
+                  <a:srgbClr val="333E48"/>
+                </a:solidFill>
+                <a:latin typeface="Roboto"/>
+                <a:ea typeface="Roboto"/>
+                <a:cs typeface="Roboto"/>
+                <a:sym typeface="Roboto"/>
+              </a:rPr>
+              <a:t>Primary Clients</a:t>
+            </a:r>
+            <a:br>
+              <a:rPr b="1" lang="en-US" sz="1200">
+                <a:solidFill>
+                  <a:srgbClr val="333E48"/>
+                </a:solidFill>
+                <a:latin typeface="Roboto"/>
+                <a:ea typeface="Roboto"/>
+                <a:cs typeface="Roboto"/>
+                <a:sym typeface="Roboto"/>
+              </a:rPr>
+            </a:br>
+            <a:r>
+              <a:rPr lang="en-US" sz="1200">
+                <a:solidFill>
+                  <a:srgbClr val="333E48"/>
+                </a:solidFill>
+                <a:latin typeface="Roboto"/>
+                <a:ea typeface="Roboto"/>
+                <a:cs typeface="Roboto"/>
+                <a:sym typeface="Roboto"/>
+              </a:rPr>
+              <a:t>Multi billion dollar companies and media/content providers such as Thompson Reuters, Charter &amp; Cablevision</a:t>
+            </a:r>
+            <a:br>
+              <a:rPr lang="en-US" sz="1200">
+                <a:solidFill>
+                  <a:srgbClr val="333E48"/>
+                </a:solidFill>
+                <a:latin typeface="Roboto"/>
+                <a:ea typeface="Roboto"/>
+                <a:cs typeface="Roboto"/>
+                <a:sym typeface="Roboto"/>
+              </a:rPr>
+            </a:br>
+            <a:br>
+              <a:rPr lang="en-US" sz="1200">
+                <a:solidFill>
+                  <a:srgbClr val="333E48"/>
+                </a:solidFill>
+                <a:latin typeface="Roboto"/>
+                <a:ea typeface="Roboto"/>
+                <a:cs typeface="Roboto"/>
+                <a:sym typeface="Roboto"/>
+              </a:rPr>
+            </a:br>
+            <a:r>
+              <a:rPr b="1" lang="en-US" sz="1400">
+                <a:solidFill>
+                  <a:srgbClr val="333E48"/>
+                </a:solidFill>
+                <a:latin typeface="Roboto"/>
+                <a:ea typeface="Roboto"/>
+                <a:cs typeface="Roboto"/>
+                <a:sym typeface="Roboto"/>
+              </a:rPr>
+              <a:t>Locations</a:t>
+            </a:r>
+            <a:br>
+              <a:rPr b="1" lang="en-US" sz="1200">
+                <a:solidFill>
+                  <a:srgbClr val="333E48"/>
+                </a:solidFill>
+                <a:latin typeface="Roboto"/>
+                <a:ea typeface="Roboto"/>
+                <a:cs typeface="Roboto"/>
+                <a:sym typeface="Roboto"/>
+              </a:rPr>
+            </a:br>
+            <a:r>
+              <a:rPr lang="en-US" sz="1200">
+                <a:solidFill>
+                  <a:srgbClr val="333E48"/>
+                </a:solidFill>
+                <a:latin typeface="Roboto"/>
+                <a:ea typeface="Roboto"/>
+                <a:cs typeface="Roboto"/>
+                <a:sym typeface="Roboto"/>
+              </a:rPr>
+              <a:t>Providence (RI), New York (NY), Denver (CO), Los Angeles (CA), and a London presence</a:t>
+            </a:r>
+            <a:endParaRPr sz="1200">
+              <a:solidFill>
+                <a:srgbClr val="333E48"/>
+              </a:solidFill>
+              <a:latin typeface="Calibri"/>
+              <a:ea typeface="Calibri"/>
+              <a:cs typeface="Calibri"/>
+              <a:sym typeface="Calibri"/>
+            </a:endParaRPr>
+          </a:p>
+          <a:p>
+            <a:pPr indent="0" lvl="0" marL="0" marR="0" rtl="0" algn="l">
+              <a:spcBef>
+                <a:spcPts val="900"/>
+              </a:spcBef>
+              <a:spcAft>
+                <a:spcPts val="0"/>
+              </a:spcAft>
+              <a:buNone/>
+            </a:pPr>
+            <a:r>
+              <a:rPr b="1" lang="en-US" sz="1400">
+                <a:solidFill>
+                  <a:srgbClr val="333E48"/>
+                </a:solidFill>
+                <a:latin typeface="Roboto"/>
+                <a:ea typeface="Roboto"/>
+                <a:cs typeface="Roboto"/>
+                <a:sym typeface="Roboto"/>
+              </a:rPr>
+              <a:t>Founded in 2004.</a:t>
+            </a:r>
+            <a:endParaRPr sz="1400">
+              <a:solidFill>
+                <a:srgbClr val="333E48"/>
+              </a:solidFill>
+              <a:latin typeface="Calibri"/>
+              <a:ea typeface="Calibri"/>
+              <a:cs typeface="Calibri"/>
+              <a:sym typeface="Calibri"/>
+            </a:endParaRPr>
+          </a:p>
+          <a:p>
+            <a:pPr indent="0" lvl="0" marL="0" marR="0" rtl="0" algn="l">
+              <a:spcBef>
+                <a:spcPts val="900"/>
+              </a:spcBef>
+              <a:spcAft>
+                <a:spcPts val="0"/>
+              </a:spcAft>
+              <a:buNone/>
+            </a:pPr>
+            <a:br>
+              <a:rPr lang="en-US" sz="1200">
+                <a:solidFill>
+                  <a:srgbClr val="333E48"/>
+                </a:solidFill>
+                <a:latin typeface="Calibri"/>
+                <a:ea typeface="Calibri"/>
+                <a:cs typeface="Calibri"/>
+                <a:sym typeface="Calibri"/>
+              </a:rPr>
+            </a:br>
+            <a:endParaRPr sz="1200">
+              <a:solidFill>
+                <a:srgbClr val="333E48"/>
+              </a:solidFill>
+              <a:latin typeface="Calibri"/>
+              <a:ea typeface="Calibri"/>
+              <a:cs typeface="Calibri"/>
+              <a:sym typeface="Calibri"/>
+            </a:endParaRPr>
+          </a:p>
+        </p:txBody>
+      </p:sp>
+      <p:sp>
+        <p:nvSpPr>
+          <p:cNvPr id="134" name="Shape 134"/>
+          <p:cNvSpPr/>
+          <p:nvPr/>
+        </p:nvSpPr>
+        <p:spPr>
+          <a:xfrm>
+            <a:off x="4542129" y="403428"/>
+            <a:ext cx="4237424" cy="1077218"/>
+          </a:xfrm>
+          <a:prstGeom prst="rect">
+            <a:avLst/>
+          </a:prstGeom>
+          <a:noFill/>
+          <a:ln>
+            <a:noFill/>
+          </a:ln>
+        </p:spPr>
+        <p:txBody>
+          <a:bodyPr anchorCtr="0" anchor="t" bIns="45700" lIns="91425" spcFirstLastPara="1" rIns="91425" wrap="square" tIns="45700">
+            <a:noAutofit/>
+          </a:bodyPr>
+          <a:lstStyle/>
+          <a:p>
+            <a:pPr indent="0" lvl="0" marL="0" marR="0" rtl="0" algn="l">
+              <a:spcBef>
+                <a:spcPts val="0"/>
+              </a:spcBef>
+              <a:spcAft>
+                <a:spcPts val="0"/>
+              </a:spcAft>
+              <a:buNone/>
+            </a:pPr>
+            <a:r>
+              <a:rPr b="1" lang="en-US" sz="1600">
+                <a:solidFill>
+                  <a:schemeClr val="lt1"/>
+                </a:solidFill>
+                <a:latin typeface="Roboto"/>
+                <a:ea typeface="Roboto"/>
+                <a:cs typeface="Roboto"/>
+                <a:sym typeface="Roboto"/>
+              </a:rPr>
+              <a:t>We are a software engineering and digital consulting firm that has been helping clients </a:t>
+            </a:r>
+            <a:r>
+              <a:rPr b="1" i="1" lang="en-US" sz="1600">
+                <a:solidFill>
+                  <a:schemeClr val="lt1"/>
+                </a:solidFill>
+                <a:latin typeface="Roboto"/>
+                <a:ea typeface="Roboto"/>
+                <a:cs typeface="Roboto"/>
+                <a:sym typeface="Roboto"/>
+              </a:rPr>
+              <a:t>Make Next Possible</a:t>
+            </a:r>
+            <a:r>
+              <a:rPr b="1" lang="en-US" sz="1600">
+                <a:solidFill>
+                  <a:schemeClr val="lt1"/>
+                </a:solidFill>
+                <a:latin typeface="Roboto"/>
+                <a:ea typeface="Roboto"/>
+                <a:cs typeface="Roboto"/>
+                <a:sym typeface="Roboto"/>
+              </a:rPr>
+              <a:t> for over a decade:</a:t>
+            </a:r>
+            <a:endParaRPr sz="1600">
+              <a:solidFill>
+                <a:schemeClr val="lt1"/>
+              </a:solidFill>
+              <a:latin typeface="Calibri"/>
+              <a:ea typeface="Calibri"/>
+              <a:cs typeface="Calibri"/>
+              <a:sym typeface="Calibri"/>
+            </a:endParaRPr>
+          </a:p>
+        </p:txBody>
+      </p:sp>
+      <p:sp>
+        <p:nvSpPr>
+          <p:cNvPr id="135" name="Shape 135"/>
+          <p:cNvSpPr/>
+          <p:nvPr/>
+        </p:nvSpPr>
+        <p:spPr>
+          <a:xfrm>
+            <a:off x="4572122" y="1682140"/>
+            <a:ext cx="4432496" cy="3877985"/>
+          </a:xfrm>
+          <a:prstGeom prst="rect">
+            <a:avLst/>
+          </a:prstGeom>
+          <a:noFill/>
+          <a:ln>
+            <a:noFill/>
+          </a:ln>
+        </p:spPr>
+        <p:txBody>
+          <a:bodyPr anchorCtr="0" anchor="t" bIns="45700" lIns="91425" spcFirstLastPara="1" rIns="91425" wrap="square" tIns="45700">
+            <a:noAutofit/>
+          </a:bodyPr>
+          <a:lstStyle/>
+          <a:p>
+            <a:pPr indent="0" lvl="0" marL="0" marR="0" rtl="0" algn="l">
+              <a:spcBef>
+                <a:spcPts val="0"/>
+              </a:spcBef>
+              <a:spcAft>
+                <a:spcPts val="0"/>
+              </a:spcAft>
+              <a:buNone/>
+            </a:pPr>
+            <a:r>
+              <a:rPr b="1" lang="en-US" sz="1400">
+                <a:solidFill>
+                  <a:schemeClr val="lt1"/>
+                </a:solidFill>
+                <a:latin typeface="Roboto"/>
+                <a:ea typeface="Roboto"/>
+                <a:cs typeface="Roboto"/>
+                <a:sym typeface="Roboto"/>
+              </a:rPr>
+              <a:t>Full Service Consulting Firm</a:t>
+            </a:r>
+            <a:br>
+              <a:rPr lang="en-US" sz="1400">
+                <a:solidFill>
+                  <a:schemeClr val="lt1"/>
+                </a:solidFill>
+                <a:latin typeface="Roboto"/>
+                <a:ea typeface="Roboto"/>
+                <a:cs typeface="Roboto"/>
+                <a:sym typeface="Roboto"/>
+              </a:rPr>
+            </a:br>
+            <a:r>
+              <a:rPr lang="en-US" sz="1400">
+                <a:solidFill>
+                  <a:schemeClr val="lt1"/>
+                </a:solidFill>
+                <a:latin typeface="Roboto"/>
+                <a:ea typeface="Roboto"/>
+                <a:cs typeface="Roboto"/>
+                <a:sym typeface="Roboto"/>
+              </a:rPr>
+              <a:t>Architecture, front and back end development, business analysis and DevTest.</a:t>
+            </a:r>
+            <a:endParaRPr/>
+          </a:p>
+          <a:p>
+            <a:pPr indent="0" lvl="0" marL="0" marR="0" rtl="0" algn="l">
+              <a:spcBef>
+                <a:spcPts val="1500"/>
+              </a:spcBef>
+              <a:spcAft>
+                <a:spcPts val="0"/>
+              </a:spcAft>
+              <a:buNone/>
+            </a:pPr>
+            <a:r>
+              <a:rPr b="1" lang="en-US" sz="1400">
+                <a:solidFill>
+                  <a:schemeClr val="lt1"/>
+                </a:solidFill>
+                <a:latin typeface="Roboto"/>
+                <a:ea typeface="Roboto"/>
+                <a:cs typeface="Roboto"/>
+                <a:sym typeface="Roboto"/>
+              </a:rPr>
+              <a:t>Cloud Virtualization Experts And Enablers</a:t>
+            </a:r>
+            <a:br>
+              <a:rPr lang="en-US" sz="1400">
+                <a:solidFill>
+                  <a:schemeClr val="lt1"/>
+                </a:solidFill>
+                <a:latin typeface="Roboto"/>
+                <a:ea typeface="Roboto"/>
+                <a:cs typeface="Roboto"/>
+                <a:sym typeface="Roboto"/>
+              </a:rPr>
+            </a:br>
+            <a:r>
+              <a:rPr lang="en-US" sz="1400">
+                <a:solidFill>
+                  <a:schemeClr val="lt1"/>
+                </a:solidFill>
+                <a:latin typeface="Roboto"/>
+                <a:ea typeface="Roboto"/>
+                <a:cs typeface="Roboto"/>
+                <a:sym typeface="Roboto"/>
+              </a:rPr>
+              <a:t>AWS, Netflix stack, enterprise architecture and beyond.</a:t>
+            </a:r>
+            <a:endParaRPr/>
+          </a:p>
+          <a:p>
+            <a:pPr indent="0" lvl="0" marL="0" marR="0" rtl="0" algn="l">
+              <a:spcBef>
+                <a:spcPts val="1500"/>
+              </a:spcBef>
+              <a:spcAft>
+                <a:spcPts val="0"/>
+              </a:spcAft>
+              <a:buNone/>
+            </a:pPr>
+            <a:r>
+              <a:rPr b="1" lang="en-US" sz="1400">
+                <a:solidFill>
+                  <a:schemeClr val="lt1"/>
+                </a:solidFill>
+                <a:latin typeface="Roboto"/>
+                <a:ea typeface="Roboto"/>
+                <a:cs typeface="Roboto"/>
+                <a:sym typeface="Roboto"/>
+              </a:rPr>
+              <a:t>DevOps Leadership</a:t>
+            </a:r>
+            <a:br>
+              <a:rPr lang="en-US" sz="1400">
+                <a:solidFill>
+                  <a:schemeClr val="lt1"/>
+                </a:solidFill>
+                <a:latin typeface="Roboto"/>
+                <a:ea typeface="Roboto"/>
+                <a:cs typeface="Roboto"/>
+                <a:sym typeface="Roboto"/>
+              </a:rPr>
+            </a:br>
+            <a:r>
+              <a:rPr lang="en-US" sz="1400">
+                <a:solidFill>
+                  <a:schemeClr val="lt1"/>
+                </a:solidFill>
+                <a:latin typeface="Roboto"/>
+                <a:ea typeface="Roboto"/>
+                <a:cs typeface="Roboto"/>
+                <a:sym typeface="Roboto"/>
+              </a:rPr>
+              <a:t>Platform builds, continuous delivery and scalable resourcing.</a:t>
+            </a:r>
+            <a:endParaRPr/>
+          </a:p>
+          <a:p>
+            <a:pPr indent="0" lvl="0" marL="0" marR="0" rtl="0" algn="l">
+              <a:spcBef>
+                <a:spcPts val="1500"/>
+              </a:spcBef>
+              <a:spcAft>
+                <a:spcPts val="0"/>
+              </a:spcAft>
+              <a:buNone/>
+            </a:pPr>
+            <a:r>
+              <a:rPr b="1" lang="en-US" sz="1400">
+                <a:solidFill>
+                  <a:schemeClr val="lt1"/>
+                </a:solidFill>
+                <a:latin typeface="Roboto"/>
+                <a:ea typeface="Roboto"/>
+                <a:cs typeface="Roboto"/>
+                <a:sym typeface="Roboto"/>
+              </a:rPr>
+              <a:t>Veterans of the Media Industry</a:t>
+            </a:r>
+            <a:br>
+              <a:rPr lang="en-US" sz="1400">
+                <a:solidFill>
+                  <a:schemeClr val="lt1"/>
+                </a:solidFill>
+                <a:latin typeface="Roboto"/>
+                <a:ea typeface="Roboto"/>
+                <a:cs typeface="Roboto"/>
+                <a:sym typeface="Roboto"/>
+              </a:rPr>
+            </a:br>
+            <a:r>
+              <a:rPr lang="en-US" sz="1400">
+                <a:solidFill>
+                  <a:schemeClr val="lt1"/>
+                </a:solidFill>
+                <a:latin typeface="Roboto"/>
+                <a:ea typeface="Roboto"/>
+                <a:cs typeface="Roboto"/>
+                <a:sym typeface="Roboto"/>
+              </a:rPr>
+              <a:t>Migrations, enterprise wide solutions, digital experts and thought leaders.</a:t>
+            </a:r>
+            <a:endParaRPr/>
+          </a:p>
+          <a:p>
+            <a:pPr indent="0" lvl="0" marL="0" marR="0" rtl="0" algn="l">
+              <a:spcBef>
+                <a:spcPts val="1500"/>
+              </a:spcBef>
+              <a:spcAft>
+                <a:spcPts val="0"/>
+              </a:spcAft>
+              <a:buNone/>
+            </a:pPr>
+            <a:r>
+              <a:rPr b="1" lang="en-US" sz="1400">
+                <a:solidFill>
+                  <a:schemeClr val="lt1"/>
+                </a:solidFill>
+                <a:latin typeface="Roboto"/>
+                <a:ea typeface="Roboto"/>
+                <a:cs typeface="Roboto"/>
+                <a:sym typeface="Roboto"/>
+              </a:rPr>
+              <a:t>Employee focused </a:t>
+            </a:r>
+            <a:br>
+              <a:rPr lang="en-US" sz="1400">
+                <a:solidFill>
+                  <a:schemeClr val="lt1"/>
+                </a:solidFill>
+                <a:latin typeface="Roboto"/>
+                <a:ea typeface="Roboto"/>
+                <a:cs typeface="Roboto"/>
+                <a:sym typeface="Roboto"/>
+              </a:rPr>
+            </a:br>
+            <a:r>
+              <a:rPr lang="en-US" sz="1400">
+                <a:solidFill>
+                  <a:schemeClr val="lt1"/>
+                </a:solidFill>
+                <a:latin typeface="Roboto"/>
+                <a:ea typeface="Roboto"/>
+                <a:cs typeface="Roboto"/>
+                <a:sym typeface="Roboto"/>
+              </a:rPr>
+              <a:t>Collaboration, communication and culture are key.</a:t>
+            </a:r>
+            <a:endParaRPr sz="1400">
               <a:solidFill>
                 <a:schemeClr val="lt1"/>
               </a:solidFill>
@@ -38147,7 +38549,7 @@
   <p:cSld>
     <p:spTree>
       <p:nvGrpSpPr>
-        <p:cNvPr id="138" name="Shape 138"/>
+        <p:cNvPr id="139" name="Shape 139"/>
         <p:cNvGrpSpPr/>
         <p:nvPr/>
       </p:nvGrpSpPr>
@@ -38159,57 +38561,6 @@
           <a:chExt cx="0" cy="0"/>
         </a:xfrm>
       </p:grpSpPr>
-      <p:sp>
-        <p:nvSpPr>
-          <p:cNvPr id="139" name="Shape 139"/>
-          <p:cNvSpPr/>
-          <p:nvPr/>
-        </p:nvSpPr>
-        <p:spPr>
-          <a:xfrm>
-            <a:off x="4315600" y="0"/>
-            <a:ext cx="4828400" cy="6858000"/>
-          </a:xfrm>
-          <a:prstGeom prst="rect">
-            <a:avLst/>
-          </a:prstGeom>
-          <a:solidFill>
-            <a:srgbClr val="333E48"/>
-          </a:solidFill>
-          <a:ln>
-            <a:noFill/>
-          </a:ln>
-        </p:spPr>
-        <p:txBody>
-          <a:bodyPr anchorCtr="0" anchor="t" bIns="45700" lIns="91425" spcFirstLastPara="1" rIns="91425" wrap="square" tIns="45700">
-            <a:noAutofit/>
-          </a:bodyPr>
-          <a:lstStyle/>
-          <a:p>
-            <a:pPr indent="0" lvl="0" marL="0" marR="0" rtl="0" algn="ctr">
-              <a:spcBef>
-                <a:spcPts val="0"/>
-              </a:spcBef>
-              <a:spcAft>
-                <a:spcPts val="0"/>
-              </a:spcAft>
-              <a:buNone/>
-            </a:pPr>
-            <a:r>
-              <a:t/>
-            </a:r>
-            <a:endParaRPr sz="1200">
-              <a:solidFill>
-                <a:srgbClr val="333E48"/>
-              </a:solidFill>
-              <a:latin typeface="Roboto"/>
-              <a:ea typeface="Roboto"/>
-              <a:cs typeface="Roboto"/>
-              <a:sym typeface="Roboto"/>
-            </a:endParaRPr>
-          </a:p>
-        </p:txBody>
-      </p:sp>
       <p:grpSp>
         <p:nvGrpSpPr>
           <p:cNvPr id="140" name="Shape 140"/>
@@ -38218,10 +38569,10 @@
         </p:nvGrpSpPr>
         <p:grpSpPr>
           <a:xfrm>
-            <a:off x="0" y="-45720"/>
-            <a:ext cx="9144000" cy="45719"/>
-            <a:chOff x="-1" y="4239484"/>
-            <a:chExt cx="9144001" cy="184641"/>
+            <a:off x="-114" y="-45763"/>
+            <a:ext cx="9144230" cy="45717"/>
+            <a:chOff x="-115" y="4239484"/>
+            <a:chExt cx="9144230" cy="184640"/>
           </a:xfrm>
         </p:grpSpPr>
         <p:sp>
@@ -38232,8 +38583,8 @@
           </p:nvSpPr>
           <p:spPr>
             <a:xfrm rot="10800000">
-              <a:off x="-1" y="4239487"/>
-              <a:ext cx="1581786" cy="184637"/>
+              <a:off x="-115" y="4239624"/>
+              <a:ext cx="1581900" cy="184500"/>
             </a:xfrm>
             <a:prstGeom prst="rect">
               <a:avLst/>
@@ -38284,7 +38635,7 @@
           <p:spPr>
             <a:xfrm>
               <a:off x="1512443" y="4239484"/>
-              <a:ext cx="1581785" cy="184641"/>
+              <a:ext cx="1581900" cy="184500"/>
             </a:xfrm>
             <a:prstGeom prst="rect">
               <a:avLst/>
@@ -38335,7 +38686,7 @@
           <p:spPr>
             <a:xfrm>
               <a:off x="3024886" y="4239484"/>
-              <a:ext cx="1581785" cy="184641"/>
+              <a:ext cx="1581900" cy="184500"/>
             </a:xfrm>
             <a:prstGeom prst="rect">
               <a:avLst/>
@@ -38386,7 +38737,7 @@
           <p:spPr>
             <a:xfrm>
               <a:off x="4537329" y="4239484"/>
-              <a:ext cx="1581785" cy="184641"/>
+              <a:ext cx="1581900" cy="184500"/>
             </a:xfrm>
             <a:prstGeom prst="rect">
               <a:avLst/>
@@ -38437,7 +38788,7 @@
           <p:spPr>
             <a:xfrm>
               <a:off x="6049772" y="4239484"/>
-              <a:ext cx="1581785" cy="184641"/>
+              <a:ext cx="1581900" cy="184500"/>
             </a:xfrm>
             <a:prstGeom prst="rect">
               <a:avLst/>
@@ -38488,7 +38839,7 @@
           <p:spPr>
             <a:xfrm>
               <a:off x="7562215" y="4239484"/>
-              <a:ext cx="1581785" cy="184641"/>
+              <a:ext cx="1581900" cy="184500"/>
             </a:xfrm>
             <a:prstGeom prst="rect">
               <a:avLst/>
@@ -38539,8 +38890,8 @@
         </p:nvSpPr>
         <p:spPr>
           <a:xfrm>
-            <a:off x="220784" y="179350"/>
-            <a:ext cx="3518096" cy="1323439"/>
+            <a:off x="297475" y="135094"/>
+            <a:ext cx="4615500" cy="702300"/>
           </a:xfrm>
           <a:prstGeom prst="rect">
             <a:avLst/>
@@ -38575,39 +38926,7 @@
                 <a:cs typeface="Roboto"/>
                 <a:sym typeface="Roboto"/>
               </a:rPr>
-              <a:t>About </a:t>
-            </a:r>
-            <a:endParaRPr b="1" sz="4000">
-              <a:solidFill>
-                <a:srgbClr val="333E48"/>
-              </a:solidFill>
-              <a:latin typeface="Roboto"/>
-              <a:ea typeface="Roboto"/>
-              <a:cs typeface="Roboto"/>
-              <a:sym typeface="Roboto"/>
-            </a:endParaRPr>
-          </a:p>
-          <a:p>
-            <a:pPr indent="0" lvl="0" marL="0" marR="0" rtl="0" algn="l">
-              <a:spcBef>
-                <a:spcPts val="0"/>
-              </a:spcBef>
-              <a:spcAft>
-                <a:spcPts val="0"/>
-              </a:spcAft>
-              <a:buNone/>
-            </a:pPr>
-            <a:r>
-              <a:rPr b="1" lang="en-US" sz="4000">
-                <a:solidFill>
-                  <a:srgbClr val="333E48"/>
-                </a:solidFill>
-                <a:latin typeface="Roboto"/>
-                <a:ea typeface="Roboto"/>
-                <a:cs typeface="Roboto"/>
-                <a:sym typeface="Roboto"/>
-              </a:rPr>
-              <a:t>Kenzan</a:t>
+              <a:t>Agenda</a:t>
             </a:r>
             <a:endParaRPr b="1" sz="4000">
               <a:solidFill>
@@ -38621,16 +38940,72 @@
           </a:p>
         </p:txBody>
       </p:sp>
+      <p:pic>
+        <p:nvPicPr>
+          <p:cNvPr id="148" name="Shape 148"/>
+          <p:cNvPicPr preferRelativeResize="0"/>
+          <p:nvPr/>
+        </p:nvPicPr>
+        <p:blipFill>
+          <a:blip r:embed="rId3">
+            <a:alphaModFix/>
+          </a:blip>
+          <a:stretch>
+            <a:fillRect/>
+          </a:stretch>
+        </p:blipFill>
+        <p:spPr>
+          <a:xfrm>
+            <a:off x="407175" y="913475"/>
+            <a:ext cx="8736951" cy="6400626"/>
+          </a:xfrm>
+          <a:prstGeom prst="rect">
+            <a:avLst/>
+          </a:prstGeom>
+          <a:noFill/>
+          <a:ln>
+            <a:noFill/>
+          </a:ln>
+        </p:spPr>
+      </p:pic>
+      <p:pic>
+        <p:nvPicPr>
+          <p:cNvPr id="149" name="Shape 149"/>
+          <p:cNvPicPr preferRelativeResize="0"/>
+          <p:nvPr/>
+        </p:nvPicPr>
+        <p:blipFill>
+          <a:blip r:embed="rId4">
+            <a:alphaModFix/>
+          </a:blip>
+          <a:stretch>
+            <a:fillRect/>
+          </a:stretch>
+        </p:blipFill>
+        <p:spPr>
+          <a:xfrm>
+            <a:off x="0" y="1674625"/>
+            <a:ext cx="5761850" cy="3834250"/>
+          </a:xfrm>
+          <a:prstGeom prst="rect">
+            <a:avLst/>
+          </a:prstGeom>
+          <a:noFill/>
+          <a:ln>
+            <a:noFill/>
+          </a:ln>
+        </p:spPr>
+      </p:pic>
       <p:sp>
         <p:nvSpPr>
-          <p:cNvPr id="148" name="Shape 148"/>
+          <p:cNvPr id="150" name="Shape 150"/>
           <p:cNvSpPr/>
           <p:nvPr/>
         </p:nvSpPr>
         <p:spPr>
           <a:xfrm>
-            <a:off x="220784" y="1682140"/>
-            <a:ext cx="3518096" cy="3331681"/>
+            <a:off x="716350" y="2019000"/>
+            <a:ext cx="4806600" cy="2972400"/>
           </a:xfrm>
           <a:prstGeom prst="rect">
             <a:avLst/>
@@ -38647,6 +39022,9 @@
           <a:lstStyle/>
           <a:p>
             <a:pPr indent="0" lvl="0" marL="0" marR="0" rtl="0" algn="l">
+              <a:lnSpc>
+                <a:spcPct val="100000"/>
+              </a:lnSpc>
               <a:spcBef>
                 <a:spcPts val="0"/>
               </a:spcBef>
@@ -38656,21 +39034,181 @@
               <a:buNone/>
             </a:pPr>
             <a:r>
-              <a:rPr b="1" lang="en-US" sz="1400">
-                <a:solidFill>
-                  <a:srgbClr val="333E48"/>
+              <a:rPr b="1" lang="en-US" sz="1800">
+                <a:solidFill>
+                  <a:schemeClr val="lt1"/>
                 </a:solidFill>
                 <a:latin typeface="Roboto"/>
                 <a:ea typeface="Roboto"/>
                 <a:cs typeface="Roboto"/>
                 <a:sym typeface="Roboto"/>
               </a:rPr>
-              <a:t>Core offerings</a:t>
+              <a:t>Multiple Part Series Focusing on:</a:t>
+            </a:r>
+            <a:endParaRPr b="1" sz="1800">
+              <a:solidFill>
+                <a:schemeClr val="lt1"/>
+              </a:solidFill>
+              <a:latin typeface="Roboto"/>
+              <a:ea typeface="Roboto"/>
+              <a:cs typeface="Roboto"/>
+              <a:sym typeface="Roboto"/>
+            </a:endParaRPr>
+          </a:p>
+          <a:p>
+            <a:pPr indent="-342900" lvl="0" marL="457200" marR="0" rtl="0" algn="l">
+              <a:lnSpc>
+                <a:spcPct val="100000"/>
+              </a:lnSpc>
+              <a:spcBef>
+                <a:spcPts val="600"/>
+              </a:spcBef>
+              <a:spcAft>
+                <a:spcPts val="0"/>
+              </a:spcAft>
+              <a:buClr>
+                <a:schemeClr val="lt1"/>
+              </a:buClr>
+              <a:buSzPts val="1800"/>
+              <a:buFont typeface="Roboto"/>
+              <a:buChar char="●"/>
+            </a:pPr>
+            <a:r>
+              <a:rPr b="1" lang="en-US" sz="1800">
+                <a:solidFill>
+                  <a:schemeClr val="lt1"/>
+                </a:solidFill>
+                <a:latin typeface="Roboto"/>
+                <a:ea typeface="Roboto"/>
+                <a:cs typeface="Roboto"/>
+                <a:sym typeface="Roboto"/>
+              </a:rPr>
+              <a:t>Platform &amp; Infrastructure</a:t>
+            </a:r>
+            <a:endParaRPr b="1" sz="1800">
+              <a:solidFill>
+                <a:schemeClr val="lt1"/>
+              </a:solidFill>
+              <a:latin typeface="Roboto"/>
+              <a:ea typeface="Roboto"/>
+              <a:cs typeface="Roboto"/>
+              <a:sym typeface="Roboto"/>
+            </a:endParaRPr>
+          </a:p>
+          <a:p>
+            <a:pPr indent="-342900" lvl="0" marL="457200" marR="0" rtl="0" algn="l">
+              <a:lnSpc>
+                <a:spcPct val="100000"/>
+              </a:lnSpc>
+              <a:spcBef>
+                <a:spcPts val="0"/>
+              </a:spcBef>
+              <a:spcAft>
+                <a:spcPts val="0"/>
+              </a:spcAft>
+              <a:buClr>
+                <a:schemeClr val="lt1"/>
+              </a:buClr>
+              <a:buSzPts val="1800"/>
+              <a:buFont typeface="Roboto"/>
+              <a:buChar char="●"/>
+            </a:pPr>
+            <a:r>
+              <a:rPr b="1" lang="en-US" sz="1800">
+                <a:solidFill>
+                  <a:schemeClr val="lt1"/>
+                </a:solidFill>
+                <a:latin typeface="Roboto"/>
+                <a:ea typeface="Roboto"/>
+                <a:cs typeface="Roboto"/>
+                <a:sym typeface="Roboto"/>
+              </a:rPr>
+              <a:t>Continuous Delivery</a:t>
+            </a:r>
+            <a:endParaRPr b="1" sz="1800">
+              <a:solidFill>
+                <a:schemeClr val="lt1"/>
+              </a:solidFill>
+              <a:latin typeface="Roboto"/>
+              <a:ea typeface="Roboto"/>
+              <a:cs typeface="Roboto"/>
+              <a:sym typeface="Roboto"/>
+            </a:endParaRPr>
+          </a:p>
+          <a:p>
+            <a:pPr indent="-342900" lvl="0" marL="457200" marR="0" rtl="0" algn="l">
+              <a:lnSpc>
+                <a:spcPct val="100000"/>
+              </a:lnSpc>
+              <a:spcBef>
+                <a:spcPts val="0"/>
+              </a:spcBef>
+              <a:spcAft>
+                <a:spcPts val="0"/>
+              </a:spcAft>
+              <a:buClr>
+                <a:schemeClr val="lt1"/>
+              </a:buClr>
+              <a:buSzPts val="1800"/>
+              <a:buFont typeface="Roboto"/>
+              <a:buChar char="●"/>
+            </a:pPr>
+            <a:r>
+              <a:rPr b="1" lang="en-US" sz="1800">
+                <a:solidFill>
+                  <a:schemeClr val="lt1"/>
+                </a:solidFill>
+                <a:latin typeface="Roboto"/>
+                <a:ea typeface="Roboto"/>
+                <a:cs typeface="Roboto"/>
+                <a:sym typeface="Roboto"/>
+              </a:rPr>
+              <a:t>Continuous Integration</a:t>
+            </a:r>
+            <a:endParaRPr b="1" sz="1800">
+              <a:solidFill>
+                <a:schemeClr val="lt1"/>
+              </a:solidFill>
+              <a:latin typeface="Roboto"/>
+              <a:ea typeface="Roboto"/>
+              <a:cs typeface="Roboto"/>
+              <a:sym typeface="Roboto"/>
+            </a:endParaRPr>
+          </a:p>
+          <a:p>
+            <a:pPr indent="-342900" lvl="0" marL="457200" marR="0" rtl="0" algn="l">
+              <a:lnSpc>
+                <a:spcPct val="100000"/>
+              </a:lnSpc>
+              <a:spcBef>
+                <a:spcPts val="0"/>
+              </a:spcBef>
+              <a:spcAft>
+                <a:spcPts val="0"/>
+              </a:spcAft>
+              <a:buClr>
+                <a:schemeClr val="lt1"/>
+              </a:buClr>
+              <a:buSzPts val="1800"/>
+              <a:buFont typeface="Roboto"/>
+              <a:buChar char="●"/>
+            </a:pPr>
+            <a:r>
+              <a:rPr b="1" lang="en-US" sz="1800">
+                <a:solidFill>
+                  <a:schemeClr val="lt1"/>
+                </a:solidFill>
+                <a:latin typeface="Roboto"/>
+                <a:ea typeface="Roboto"/>
+                <a:cs typeface="Roboto"/>
+                <a:sym typeface="Roboto"/>
+              </a:rPr>
+              <a:t>Application</a:t>
             </a:r>
             <a:br>
-              <a:rPr lang="en-US" sz="1200">
-                <a:solidFill>
-                  <a:srgbClr val="333E48"/>
+              <a:rPr b="1" lang="en-US" sz="1800">
+                <a:solidFill>
+                  <a:schemeClr val="lt1"/>
                 </a:solidFill>
                 <a:latin typeface="Roboto"/>
                 <a:ea typeface="Roboto"/>
@@ -38678,545 +39216,7 @@
                 <a:sym typeface="Roboto"/>
               </a:rPr>
             </a:br>
-            <a:r>
-              <a:rPr lang="en-US" sz="1200">
-                <a:solidFill>
-                  <a:srgbClr val="333E48"/>
-                </a:solidFill>
-                <a:latin typeface="Roboto"/>
-                <a:ea typeface="Roboto"/>
-                <a:cs typeface="Roboto"/>
-                <a:sym typeface="Roboto"/>
-              </a:rPr>
-              <a:t>Application Development, Platform as a service, cloud virtualization, platform engineering, consulting services and business transformation.</a:t>
-            </a:r>
-            <a:endParaRPr sz="1200">
-              <a:solidFill>
-                <a:srgbClr val="333E48"/>
-              </a:solidFill>
-              <a:latin typeface="Calibri"/>
-              <a:ea typeface="Calibri"/>
-              <a:cs typeface="Calibri"/>
-              <a:sym typeface="Calibri"/>
-            </a:endParaRPr>
-          </a:p>
-          <a:p>
-            <a:pPr indent="0" lvl="0" marL="0" marR="0" rtl="0" algn="l">
-              <a:spcBef>
-                <a:spcPts val="900"/>
-              </a:spcBef>
-              <a:spcAft>
-                <a:spcPts val="0"/>
-              </a:spcAft>
-              <a:buNone/>
-            </a:pPr>
-            <a:r>
-              <a:rPr b="1" lang="en-US" sz="1400">
-                <a:solidFill>
-                  <a:srgbClr val="333E48"/>
-                </a:solidFill>
-                <a:latin typeface="Roboto"/>
-                <a:ea typeface="Roboto"/>
-                <a:cs typeface="Roboto"/>
-                <a:sym typeface="Roboto"/>
-              </a:rPr>
-              <a:t>Primary Clients</a:t>
-            </a:r>
-            <a:br>
-              <a:rPr b="1" lang="en-US" sz="1200">
-                <a:solidFill>
-                  <a:srgbClr val="333E48"/>
-                </a:solidFill>
-                <a:latin typeface="Roboto"/>
-                <a:ea typeface="Roboto"/>
-                <a:cs typeface="Roboto"/>
-                <a:sym typeface="Roboto"/>
-              </a:rPr>
-            </a:br>
-            <a:r>
-              <a:rPr lang="en-US" sz="1200">
-                <a:solidFill>
-                  <a:srgbClr val="333E48"/>
-                </a:solidFill>
-                <a:latin typeface="Roboto"/>
-                <a:ea typeface="Roboto"/>
-                <a:cs typeface="Roboto"/>
-                <a:sym typeface="Roboto"/>
-              </a:rPr>
-              <a:t>Multi billion dollar companies and media/content providers such as Thompson Reuters, Charter &amp; Cablevision</a:t>
-            </a:r>
-            <a:br>
-              <a:rPr lang="en-US" sz="1200">
-                <a:solidFill>
-                  <a:srgbClr val="333E48"/>
-                </a:solidFill>
-                <a:latin typeface="Roboto"/>
-                <a:ea typeface="Roboto"/>
-                <a:cs typeface="Roboto"/>
-                <a:sym typeface="Roboto"/>
-              </a:rPr>
-            </a:br>
-            <a:br>
-              <a:rPr lang="en-US" sz="1200">
-                <a:solidFill>
-                  <a:srgbClr val="333E48"/>
-                </a:solidFill>
-                <a:latin typeface="Roboto"/>
-                <a:ea typeface="Roboto"/>
-                <a:cs typeface="Roboto"/>
-                <a:sym typeface="Roboto"/>
-              </a:rPr>
-            </a:br>
-            <a:r>
-              <a:rPr b="1" lang="en-US" sz="1400">
-                <a:solidFill>
-                  <a:srgbClr val="333E48"/>
-                </a:solidFill>
-                <a:latin typeface="Roboto"/>
-                <a:ea typeface="Roboto"/>
-                <a:cs typeface="Roboto"/>
-                <a:sym typeface="Roboto"/>
-              </a:rPr>
-              <a:t>Locations</a:t>
-            </a:r>
-            <a:br>
-              <a:rPr b="1" lang="en-US" sz="1200">
-                <a:solidFill>
-                  <a:srgbClr val="333E48"/>
-                </a:solidFill>
-                <a:latin typeface="Roboto"/>
-                <a:ea typeface="Roboto"/>
-                <a:cs typeface="Roboto"/>
-                <a:sym typeface="Roboto"/>
-              </a:rPr>
-            </a:br>
-            <a:r>
-              <a:rPr lang="en-US" sz="1200">
-                <a:solidFill>
-                  <a:srgbClr val="333E48"/>
-                </a:solidFill>
-                <a:latin typeface="Roboto"/>
-                <a:ea typeface="Roboto"/>
-                <a:cs typeface="Roboto"/>
-                <a:sym typeface="Roboto"/>
-              </a:rPr>
-              <a:t>Providence (RI), New York (NY), Denver (CO), Los Angeles (CA), and a London presence</a:t>
-            </a:r>
-            <a:endParaRPr sz="1200">
-              <a:solidFill>
-                <a:srgbClr val="333E48"/>
-              </a:solidFill>
-              <a:latin typeface="Calibri"/>
-              <a:ea typeface="Calibri"/>
-              <a:cs typeface="Calibri"/>
-              <a:sym typeface="Calibri"/>
-            </a:endParaRPr>
-          </a:p>
-          <a:p>
-            <a:pPr indent="0" lvl="0" marL="0" marR="0" rtl="0" algn="l">
-              <a:spcBef>
-                <a:spcPts val="900"/>
-              </a:spcBef>
-              <a:spcAft>
-                <a:spcPts val="0"/>
-              </a:spcAft>
-              <a:buNone/>
-            </a:pPr>
-            <a:r>
-              <a:rPr b="1" lang="en-US" sz="1400">
-                <a:solidFill>
-                  <a:srgbClr val="333E48"/>
-                </a:solidFill>
-                <a:latin typeface="Roboto"/>
-                <a:ea typeface="Roboto"/>
-                <a:cs typeface="Roboto"/>
-                <a:sym typeface="Roboto"/>
-              </a:rPr>
-              <a:t>Founded in 2004.</a:t>
-            </a:r>
-            <a:endParaRPr sz="1400">
-              <a:solidFill>
-                <a:srgbClr val="333E48"/>
-              </a:solidFill>
-              <a:latin typeface="Calibri"/>
-              <a:ea typeface="Calibri"/>
-              <a:cs typeface="Calibri"/>
-              <a:sym typeface="Calibri"/>
-            </a:endParaRPr>
-          </a:p>
-          <a:p>
-            <a:pPr indent="0" lvl="0" marL="0" marR="0" rtl="0" algn="l">
-              <a:spcBef>
-                <a:spcPts val="900"/>
-              </a:spcBef>
-              <a:spcAft>
-                <a:spcPts val="0"/>
-              </a:spcAft>
-              <a:buNone/>
-            </a:pPr>
-            <a:br>
-              <a:rPr lang="en-US" sz="1200">
-                <a:solidFill>
-                  <a:srgbClr val="333E48"/>
-                </a:solidFill>
-                <a:latin typeface="Calibri"/>
-                <a:ea typeface="Calibri"/>
-                <a:cs typeface="Calibri"/>
-                <a:sym typeface="Calibri"/>
-              </a:rPr>
-            </a:br>
-            <a:endParaRPr sz="1200">
-              <a:solidFill>
-                <a:srgbClr val="333E48"/>
-              </a:solidFill>
-              <a:latin typeface="Calibri"/>
-              <a:ea typeface="Calibri"/>
-              <a:cs typeface="Calibri"/>
-              <a:sym typeface="Calibri"/>
-            </a:endParaRPr>
-          </a:p>
-        </p:txBody>
-      </p:sp>
-      <p:sp>
-        <p:nvSpPr>
-          <p:cNvPr id="149" name="Shape 149"/>
-          <p:cNvSpPr/>
-          <p:nvPr/>
-        </p:nvSpPr>
-        <p:spPr>
-          <a:xfrm>
-            <a:off x="4542129" y="403428"/>
-            <a:ext cx="4237424" cy="1077218"/>
-          </a:xfrm>
-          <a:prstGeom prst="rect">
-            <a:avLst/>
-          </a:prstGeom>
-          <a:noFill/>
-          <a:ln>
-            <a:noFill/>
-          </a:ln>
-        </p:spPr>
-        <p:txBody>
-          <a:bodyPr anchorCtr="0" anchor="t" bIns="45700" lIns="91425" spcFirstLastPara="1" rIns="91425" wrap="square" tIns="45700">
-            <a:noAutofit/>
-          </a:bodyPr>
-          <a:lstStyle/>
-          <a:p>
-            <a:pPr indent="0" lvl="0" marL="0" marR="0" rtl="0" algn="l">
-              <a:spcBef>
-                <a:spcPts val="0"/>
-              </a:spcBef>
-              <a:spcAft>
-                <a:spcPts val="0"/>
-              </a:spcAft>
-              <a:buNone/>
-            </a:pPr>
-            <a:r>
-              <a:rPr b="1" lang="en-US" sz="1600">
-                <a:solidFill>
-                  <a:schemeClr val="lt1"/>
-                </a:solidFill>
-                <a:latin typeface="Roboto"/>
-                <a:ea typeface="Roboto"/>
-                <a:cs typeface="Roboto"/>
-                <a:sym typeface="Roboto"/>
-              </a:rPr>
-              <a:t>We are a software engineering and digital consulting firm that has been helping clients </a:t>
-            </a:r>
-            <a:r>
-              <a:rPr b="1" i="1" lang="en-US" sz="1600">
-                <a:solidFill>
-                  <a:schemeClr val="lt1"/>
-                </a:solidFill>
-                <a:latin typeface="Roboto"/>
-                <a:ea typeface="Roboto"/>
-                <a:cs typeface="Roboto"/>
-                <a:sym typeface="Roboto"/>
-              </a:rPr>
-              <a:t>Make Next Possible</a:t>
-            </a:r>
-            <a:r>
-              <a:rPr b="1" lang="en-US" sz="1600">
-                <a:solidFill>
-                  <a:schemeClr val="lt1"/>
-                </a:solidFill>
-                <a:latin typeface="Roboto"/>
-                <a:ea typeface="Roboto"/>
-                <a:cs typeface="Roboto"/>
-                <a:sym typeface="Roboto"/>
-              </a:rPr>
-              <a:t> for over a decade:</a:t>
-            </a:r>
-            <a:endParaRPr sz="1600">
-              <a:solidFill>
-                <a:schemeClr val="lt1"/>
-              </a:solidFill>
-              <a:latin typeface="Calibri"/>
-              <a:ea typeface="Calibri"/>
-              <a:cs typeface="Calibri"/>
-              <a:sym typeface="Calibri"/>
-            </a:endParaRPr>
-          </a:p>
-        </p:txBody>
-      </p:sp>
-      <p:sp>
-        <p:nvSpPr>
-          <p:cNvPr id="150" name="Shape 150"/>
-          <p:cNvSpPr/>
-          <p:nvPr/>
-        </p:nvSpPr>
-        <p:spPr>
-          <a:xfrm>
-            <a:off x="4572122" y="1682140"/>
-            <a:ext cx="4432496" cy="3877985"/>
-          </a:xfrm>
-          <a:prstGeom prst="rect">
-            <a:avLst/>
-          </a:prstGeom>
-          <a:noFill/>
-          <a:ln>
-            <a:noFill/>
-          </a:ln>
-        </p:spPr>
-        <p:txBody>
-          <a:bodyPr anchorCtr="0" anchor="t" bIns="45700" lIns="91425" spcFirstLastPara="1" rIns="91425" wrap="square" tIns="45700">
-            <a:noAutofit/>
-          </a:bodyPr>
-          <a:lstStyle/>
-          <a:p>
-            <a:pPr indent="0" lvl="0" marL="0" marR="0" rtl="0" algn="l">
-              <a:spcBef>
-                <a:spcPts val="0"/>
-              </a:spcBef>
-              <a:spcAft>
-                <a:spcPts val="0"/>
-              </a:spcAft>
-              <a:buNone/>
-            </a:pPr>
-            <a:r>
-              <a:rPr b="1" lang="en-US" sz="1400">
-                <a:solidFill>
-                  <a:schemeClr val="lt1"/>
-                </a:solidFill>
-                <a:latin typeface="Roboto"/>
-                <a:ea typeface="Roboto"/>
-                <a:cs typeface="Roboto"/>
-                <a:sym typeface="Roboto"/>
-              </a:rPr>
-              <a:t>Full Service Consulting Firm</a:t>
-            </a:r>
-            <a:br>
-              <a:rPr lang="en-US" sz="1400">
-                <a:solidFill>
-                  <a:schemeClr val="lt1"/>
-                </a:solidFill>
-                <a:latin typeface="Roboto"/>
-                <a:ea typeface="Roboto"/>
-                <a:cs typeface="Roboto"/>
-                <a:sym typeface="Roboto"/>
-              </a:rPr>
-            </a:br>
-            <a:r>
-              <a:rPr lang="en-US" sz="1400">
-                <a:solidFill>
-                  <a:schemeClr val="lt1"/>
-                </a:solidFill>
-                <a:latin typeface="Roboto"/>
-                <a:ea typeface="Roboto"/>
-                <a:cs typeface="Roboto"/>
-                <a:sym typeface="Roboto"/>
-              </a:rPr>
-              <a:t>Architecture, front and back end development, business analysis and DevTest.</a:t>
-            </a:r>
-            <a:endParaRPr/>
-          </a:p>
-          <a:p>
-            <a:pPr indent="0" lvl="0" marL="0" marR="0" rtl="0" algn="l">
-              <a:spcBef>
-                <a:spcPts val="1500"/>
-              </a:spcBef>
-              <a:spcAft>
-                <a:spcPts val="0"/>
-              </a:spcAft>
-              <a:buNone/>
-            </a:pPr>
-            <a:r>
-              <a:rPr b="1" lang="en-US" sz="1400">
-                <a:solidFill>
-                  <a:schemeClr val="lt1"/>
-                </a:solidFill>
-                <a:latin typeface="Roboto"/>
-                <a:ea typeface="Roboto"/>
-                <a:cs typeface="Roboto"/>
-                <a:sym typeface="Roboto"/>
-              </a:rPr>
-              <a:t>Cloud Virtualization Experts And Enablers</a:t>
-            </a:r>
-            <a:br>
-              <a:rPr lang="en-US" sz="1400">
-                <a:solidFill>
-                  <a:schemeClr val="lt1"/>
-                </a:solidFill>
-                <a:latin typeface="Roboto"/>
-                <a:ea typeface="Roboto"/>
-                <a:cs typeface="Roboto"/>
-                <a:sym typeface="Roboto"/>
-              </a:rPr>
-            </a:br>
-            <a:r>
-              <a:rPr lang="en-US" sz="1400">
-                <a:solidFill>
-                  <a:schemeClr val="lt1"/>
-                </a:solidFill>
-                <a:latin typeface="Roboto"/>
-                <a:ea typeface="Roboto"/>
-                <a:cs typeface="Roboto"/>
-                <a:sym typeface="Roboto"/>
-              </a:rPr>
-              <a:t>AWS, Netflix stack, enterprise architecture and beyond.</a:t>
-            </a:r>
-            <a:endParaRPr/>
-          </a:p>
-          <a:p>
-            <a:pPr indent="0" lvl="0" marL="0" marR="0" rtl="0" algn="l">
-              <a:spcBef>
-                <a:spcPts val="1500"/>
-              </a:spcBef>
-              <a:spcAft>
-                <a:spcPts val="0"/>
-              </a:spcAft>
-              <a:buNone/>
-            </a:pPr>
-            <a:r>
-              <a:rPr b="1" lang="en-US" sz="1400">
-                <a:solidFill>
-                  <a:schemeClr val="lt1"/>
-                </a:solidFill>
-                <a:latin typeface="Roboto"/>
-                <a:ea typeface="Roboto"/>
-                <a:cs typeface="Roboto"/>
-                <a:sym typeface="Roboto"/>
-              </a:rPr>
-              <a:t>DevOps Leadership</a:t>
-            </a:r>
-            <a:br>
-              <a:rPr lang="en-US" sz="1400">
-                <a:solidFill>
-                  <a:schemeClr val="lt1"/>
-                </a:solidFill>
-                <a:latin typeface="Roboto"/>
-                <a:ea typeface="Roboto"/>
-                <a:cs typeface="Roboto"/>
-                <a:sym typeface="Roboto"/>
-              </a:rPr>
-            </a:br>
-            <a:r>
-              <a:rPr lang="en-US" sz="1400">
-                <a:solidFill>
-                  <a:schemeClr val="lt1"/>
-                </a:solidFill>
-                <a:latin typeface="Roboto"/>
-                <a:ea typeface="Roboto"/>
-                <a:cs typeface="Roboto"/>
-                <a:sym typeface="Roboto"/>
-              </a:rPr>
-              <a:t>Platform builds, continuous delivery and scalable resourcing.</a:t>
-            </a:r>
-            <a:endParaRPr/>
-          </a:p>
-          <a:p>
-            <a:pPr indent="0" lvl="0" marL="0" marR="0" rtl="0" algn="l">
-              <a:spcBef>
-                <a:spcPts val="1500"/>
-              </a:spcBef>
-              <a:spcAft>
-                <a:spcPts val="0"/>
-              </a:spcAft>
-              <a:buNone/>
-            </a:pPr>
-            <a:r>
-              <a:rPr b="1" lang="en-US" sz="1400">
-                <a:solidFill>
-                  <a:schemeClr val="lt1"/>
-                </a:solidFill>
-                <a:latin typeface="Roboto"/>
-                <a:ea typeface="Roboto"/>
-                <a:cs typeface="Roboto"/>
-                <a:sym typeface="Roboto"/>
-              </a:rPr>
-              <a:t>Veterans of the Media Industry</a:t>
-            </a:r>
-            <a:br>
-              <a:rPr lang="en-US" sz="1400">
-                <a:solidFill>
-                  <a:schemeClr val="lt1"/>
-                </a:solidFill>
-                <a:latin typeface="Roboto"/>
-                <a:ea typeface="Roboto"/>
-                <a:cs typeface="Roboto"/>
-                <a:sym typeface="Roboto"/>
-              </a:rPr>
-            </a:br>
-            <a:r>
-              <a:rPr lang="en-US" sz="1400">
-                <a:solidFill>
-                  <a:schemeClr val="lt1"/>
-                </a:solidFill>
-                <a:latin typeface="Roboto"/>
-                <a:ea typeface="Roboto"/>
-                <a:cs typeface="Roboto"/>
-                <a:sym typeface="Roboto"/>
-              </a:rPr>
-              <a:t>Migrations, enterprise wide solutions, digital experts and thought leaders.</a:t>
-            </a:r>
-            <a:endParaRPr/>
-          </a:p>
-          <a:p>
-            <a:pPr indent="0" lvl="0" marL="0" marR="0" rtl="0" algn="l">
-              <a:spcBef>
-                <a:spcPts val="1500"/>
-              </a:spcBef>
-              <a:spcAft>
-                <a:spcPts val="0"/>
-              </a:spcAft>
-              <a:buNone/>
-            </a:pPr>
-            <a:r>
-              <a:rPr b="1" lang="en-US" sz="1400">
-                <a:solidFill>
-                  <a:schemeClr val="lt1"/>
-                </a:solidFill>
-                <a:latin typeface="Roboto"/>
-                <a:ea typeface="Roboto"/>
-                <a:cs typeface="Roboto"/>
-                <a:sym typeface="Roboto"/>
-              </a:rPr>
-              <a:t>Employee focused </a:t>
-            </a:r>
-            <a:br>
-              <a:rPr lang="en-US" sz="1400">
-                <a:solidFill>
-                  <a:schemeClr val="lt1"/>
-                </a:solidFill>
-                <a:latin typeface="Roboto"/>
-                <a:ea typeface="Roboto"/>
-                <a:cs typeface="Roboto"/>
-                <a:sym typeface="Roboto"/>
-              </a:rPr>
-            </a:br>
-            <a:r>
-              <a:rPr lang="en-US" sz="1400">
-                <a:solidFill>
-                  <a:schemeClr val="lt1"/>
-                </a:solidFill>
-                <a:latin typeface="Roboto"/>
-                <a:ea typeface="Roboto"/>
-                <a:cs typeface="Roboto"/>
-                <a:sym typeface="Roboto"/>
-              </a:rPr>
-              <a:t>Collaboration, communication and culture are key.</a:t>
-            </a:r>
-            <a:endParaRPr sz="1400">
+            <a:endParaRPr b="1" sz="1800">
               <a:solidFill>
                 <a:schemeClr val="lt1"/>
               </a:solidFill>

</xml_diff>